<commit_message>
Final Dashboard And Report Added
</commit_message>
<xml_diff>
--- a/All Documentations And Reports/Presentation2.pptx
+++ b/All Documentations And Reports/Presentation2.pptx
@@ -25,7 +25,11 @@
     <p:sldId id="267" r:id="rId19"/>
     <p:sldId id="268" r:id="rId20"/>
     <p:sldId id="275" r:id="rId21"/>
-    <p:sldId id="269" r:id="rId22"/>
+    <p:sldId id="277" r:id="rId22"/>
+    <p:sldId id="278" r:id="rId23"/>
+    <p:sldId id="279" r:id="rId24"/>
+    <p:sldId id="280" r:id="rId25"/>
+    <p:sldId id="269" r:id="rId26"/>
   </p:sldIdLst>
   <p:sldSz cx="12192000" cy="6858000"/>
   <p:notesSz cx="6858000" cy="9144000"/>
@@ -281,7 +285,7 @@
           <a:p>
             <a:fld id="{01F179B8-54A4-4DCE-9149-D502D1A3B727}" type="datetimeFigureOut">
               <a:rPr lang="en-IN" smtClean="0"/>
-              <a:t>08-11-2025</a:t>
+              <a:t>12-12-2025</a:t>
             </a:fld>
             <a:endParaRPr lang="en-IN"/>
           </a:p>
@@ -493,7 +497,7 @@
           <a:p>
             <a:fld id="{01F179B8-54A4-4DCE-9149-D502D1A3B727}" type="datetimeFigureOut">
               <a:rPr lang="en-IN" smtClean="0"/>
-              <a:t>08-11-2025</a:t>
+              <a:t>12-12-2025</a:t>
             </a:fld>
             <a:endParaRPr lang="en-IN"/>
           </a:p>
@@ -715,7 +719,7 @@
           <a:p>
             <a:fld id="{01F179B8-54A4-4DCE-9149-D502D1A3B727}" type="datetimeFigureOut">
               <a:rPr lang="en-IN" smtClean="0"/>
-              <a:t>08-11-2025</a:t>
+              <a:t>12-12-2025</a:t>
             </a:fld>
             <a:endParaRPr lang="en-IN"/>
           </a:p>
@@ -927,7 +931,7 @@
           <a:p>
             <a:fld id="{01F179B8-54A4-4DCE-9149-D502D1A3B727}" type="datetimeFigureOut">
               <a:rPr lang="en-IN" smtClean="0"/>
-              <a:t>08-11-2025</a:t>
+              <a:t>12-12-2025</a:t>
             </a:fld>
             <a:endParaRPr lang="en-IN"/>
           </a:p>
@@ -1215,7 +1219,7 @@
           <a:p>
             <a:fld id="{01F179B8-54A4-4DCE-9149-D502D1A3B727}" type="datetimeFigureOut">
               <a:rPr lang="en-IN" smtClean="0"/>
-              <a:t>08-11-2025</a:t>
+              <a:t>12-12-2025</a:t>
             </a:fld>
             <a:endParaRPr lang="en-IN"/>
           </a:p>
@@ -1495,7 +1499,7 @@
           <a:p>
             <a:fld id="{01F179B8-54A4-4DCE-9149-D502D1A3B727}" type="datetimeFigureOut">
               <a:rPr lang="en-IN" smtClean="0"/>
-              <a:t>08-11-2025</a:t>
+              <a:t>12-12-2025</a:t>
             </a:fld>
             <a:endParaRPr lang="en-IN"/>
           </a:p>
@@ -1922,7 +1926,7 @@
           <a:p>
             <a:fld id="{01F179B8-54A4-4DCE-9149-D502D1A3B727}" type="datetimeFigureOut">
               <a:rPr lang="en-IN" smtClean="0"/>
-              <a:t>08-11-2025</a:t>
+              <a:t>12-12-2025</a:t>
             </a:fld>
             <a:endParaRPr lang="en-IN"/>
           </a:p>
@@ -2076,7 +2080,7 @@
           <a:p>
             <a:fld id="{01F179B8-54A4-4DCE-9149-D502D1A3B727}" type="datetimeFigureOut">
               <a:rPr lang="en-IN" smtClean="0"/>
-              <a:t>08-11-2025</a:t>
+              <a:t>12-12-2025</a:t>
             </a:fld>
             <a:endParaRPr lang="en-IN"/>
           </a:p>
@@ -2201,7 +2205,7 @@
           <a:p>
             <a:fld id="{01F179B8-54A4-4DCE-9149-D502D1A3B727}" type="datetimeFigureOut">
               <a:rPr lang="en-IN" smtClean="0"/>
-              <a:t>08-11-2025</a:t>
+              <a:t>12-12-2025</a:t>
             </a:fld>
             <a:endParaRPr lang="en-IN"/>
           </a:p>
@@ -2526,7 +2530,7 @@
           <a:p>
             <a:fld id="{01F179B8-54A4-4DCE-9149-D502D1A3B727}" type="datetimeFigureOut">
               <a:rPr lang="en-IN" smtClean="0"/>
-              <a:t>08-11-2025</a:t>
+              <a:t>12-12-2025</a:t>
             </a:fld>
             <a:endParaRPr lang="en-IN"/>
           </a:p>
@@ -2827,7 +2831,7 @@
           <a:p>
             <a:fld id="{01F179B8-54A4-4DCE-9149-D502D1A3B727}" type="datetimeFigureOut">
               <a:rPr lang="en-IN" smtClean="0"/>
-              <a:t>08-11-2025</a:t>
+              <a:t>12-12-2025</a:t>
             </a:fld>
             <a:endParaRPr lang="en-IN"/>
           </a:p>
@@ -3085,7 +3089,7 @@
           <a:p>
             <a:fld id="{01F179B8-54A4-4DCE-9149-D502D1A3B727}" type="datetimeFigureOut">
               <a:rPr lang="en-IN" smtClean="0"/>
-              <a:t>08-11-2025</a:t>
+              <a:t>12-12-2025</a:t>
             </a:fld>
             <a:endParaRPr lang="en-IN"/>
           </a:p>
@@ -7189,12 +7193,57 @@
           <a:chExt cx="0" cy="0"/>
         </a:xfrm>
       </p:grpSpPr>
+      <p:sp>
+        <p:nvSpPr>
+          <p:cNvPr id="9" name="TextBox 8">
+            <a:extLst>
+              <a:ext uri="{FF2B5EF4-FFF2-40B4-BE49-F238E27FC236}">
+                <a16:creationId xmlns:a16="http://schemas.microsoft.com/office/drawing/2014/main" id="{72AB8785-8483-172D-3EA9-2740170E4909}"/>
+              </a:ext>
+            </a:extLst>
+          </p:cNvPr>
+          <p:cNvSpPr txBox="1"/>
+          <p:nvPr/>
+        </p:nvSpPr>
+        <p:spPr>
+          <a:xfrm>
+            <a:off x="2417583" y="113404"/>
+            <a:ext cx="7356833" cy="1200329"/>
+          </a:xfrm>
+          <a:prstGeom prst="rect">
+            <a:avLst/>
+          </a:prstGeom>
+          <a:noFill/>
+        </p:spPr>
+        <p:txBody>
+          <a:bodyPr wrap="square" rtlCol="0">
+            <a:spAutoFit/>
+          </a:bodyPr>
+          <a:lstStyle/>
+          <a:p>
+            <a:pPr algn="ctr"/>
+            <a:r>
+              <a:rPr lang="en-US" sz="7200" b="1" dirty="0">
+                <a:solidFill>
+                  <a:srgbClr val="31326F"/>
+                </a:solidFill>
+              </a:rPr>
+              <a:t>Project Overview</a:t>
+            </a:r>
+            <a:endParaRPr lang="en-IN" sz="7200" b="1" dirty="0">
+              <a:solidFill>
+                <a:srgbClr val="31326F"/>
+              </a:solidFill>
+            </a:endParaRPr>
+          </a:p>
+        </p:txBody>
+      </p:sp>
       <p:pic>
         <p:nvPicPr>
-          <p:cNvPr id="8" name="Picture 7">
-            <a:extLst>
-              <a:ext uri="{FF2B5EF4-FFF2-40B4-BE49-F238E27FC236}">
-                <a16:creationId xmlns:a16="http://schemas.microsoft.com/office/drawing/2014/main" id="{34909859-FDB4-4648-7DC9-470D5C54A2C9}"/>
+          <p:cNvPr id="3" name="Picture 2" descr="A screenshot of a dashboard&#10;&#10;AI-generated content may be incorrect.">
+            <a:extLst>
+              <a:ext uri="{FF2B5EF4-FFF2-40B4-BE49-F238E27FC236}">
+                <a16:creationId xmlns:a16="http://schemas.microsoft.com/office/drawing/2014/main" id="{321B8106-6599-4BFF-56F7-5092F778A3F9}"/>
               </a:ext>
             </a:extLst>
           </p:cNvPr>
@@ -7211,58 +7260,14 @@
         </p:blipFill>
         <p:spPr>
           <a:xfrm>
-            <a:off x="1309019" y="1313733"/>
-            <a:ext cx="9573961" cy="5087060"/>
+            <a:off x="1391263" y="1313733"/>
+            <a:ext cx="9409471" cy="5210737"/>
           </a:xfrm>
           <a:prstGeom prst="rect">
             <a:avLst/>
           </a:prstGeom>
         </p:spPr>
       </p:pic>
-      <p:sp>
-        <p:nvSpPr>
-          <p:cNvPr id="9" name="TextBox 8">
-            <a:extLst>
-              <a:ext uri="{FF2B5EF4-FFF2-40B4-BE49-F238E27FC236}">
-                <a16:creationId xmlns:a16="http://schemas.microsoft.com/office/drawing/2014/main" id="{72AB8785-8483-172D-3EA9-2740170E4909}"/>
-              </a:ext>
-            </a:extLst>
-          </p:cNvPr>
-          <p:cNvSpPr txBox="1"/>
-          <p:nvPr/>
-        </p:nvSpPr>
-        <p:spPr>
-          <a:xfrm>
-            <a:off x="1541361" y="113404"/>
-            <a:ext cx="9109276" cy="1200329"/>
-          </a:xfrm>
-          <a:prstGeom prst="rect">
-            <a:avLst/>
-          </a:prstGeom>
-          <a:noFill/>
-        </p:spPr>
-        <p:txBody>
-          <a:bodyPr wrap="square" rtlCol="0">
-            <a:spAutoFit/>
-          </a:bodyPr>
-          <a:lstStyle/>
-          <a:p>
-            <a:r>
-              <a:rPr lang="en-US" sz="7200" b="1" dirty="0">
-                <a:solidFill>
-                  <a:srgbClr val="31326F"/>
-                </a:solidFill>
-              </a:rPr>
-              <a:t>Project Overview</a:t>
-            </a:r>
-            <a:endParaRPr lang="en-IN" sz="7200" b="1" dirty="0">
-              <a:solidFill>
-                <a:srgbClr val="31326F"/>
-              </a:solidFill>
-            </a:endParaRPr>
-          </a:p>
-        </p:txBody>
-      </p:sp>
     </p:spTree>
     <p:extLst>
       <p:ext uri="{BB962C8B-B14F-4D97-AF65-F5344CB8AC3E}">
@@ -7289,6 +7294,498 @@
 </file>
 
 <file path=ppt/slides/slide21.xml><?xml version="1.0" encoding="utf-8"?>
+<p:sld xmlns:a="http://schemas.openxmlformats.org/drawingml/2006/main" xmlns:r="http://schemas.openxmlformats.org/officeDocument/2006/relationships" xmlns:p="http://schemas.openxmlformats.org/presentationml/2006/main">
+  <p:cSld>
+    <p:spTree>
+      <p:nvGrpSpPr>
+        <p:cNvPr id="1" name="">
+          <a:extLst>
+            <a:ext uri="{FF2B5EF4-FFF2-40B4-BE49-F238E27FC236}">
+              <a16:creationId xmlns:a16="http://schemas.microsoft.com/office/drawing/2014/main" id="{DEF3A8E3-C6DC-926E-C820-71CDD0F885B9}"/>
+            </a:ext>
+          </a:extLst>
+        </p:cNvPr>
+        <p:cNvGrpSpPr/>
+        <p:nvPr/>
+      </p:nvGrpSpPr>
+      <p:grpSpPr>
+        <a:xfrm>
+          <a:off x="0" y="0"/>
+          <a:ext cx="0" cy="0"/>
+          <a:chOff x="0" y="0"/>
+          <a:chExt cx="0" cy="0"/>
+        </a:xfrm>
+      </p:grpSpPr>
+      <p:sp>
+        <p:nvSpPr>
+          <p:cNvPr id="9" name="TextBox 8">
+            <a:extLst>
+              <a:ext uri="{FF2B5EF4-FFF2-40B4-BE49-F238E27FC236}">
+                <a16:creationId xmlns:a16="http://schemas.microsoft.com/office/drawing/2014/main" id="{AF90584C-950E-E243-5DF2-931400006A59}"/>
+              </a:ext>
+            </a:extLst>
+          </p:cNvPr>
+          <p:cNvSpPr txBox="1"/>
+          <p:nvPr/>
+        </p:nvSpPr>
+        <p:spPr>
+          <a:xfrm>
+            <a:off x="2417583" y="113404"/>
+            <a:ext cx="7356833" cy="1200329"/>
+          </a:xfrm>
+          <a:prstGeom prst="rect">
+            <a:avLst/>
+          </a:prstGeom>
+          <a:noFill/>
+        </p:spPr>
+        <p:txBody>
+          <a:bodyPr wrap="square" rtlCol="0">
+            <a:spAutoFit/>
+          </a:bodyPr>
+          <a:lstStyle/>
+          <a:p>
+            <a:pPr algn="ctr"/>
+            <a:r>
+              <a:rPr lang="en-US" sz="7200" b="1" dirty="0">
+                <a:solidFill>
+                  <a:srgbClr val="31326F"/>
+                </a:solidFill>
+              </a:rPr>
+              <a:t>Project Overview</a:t>
+            </a:r>
+            <a:endParaRPr lang="en-IN" sz="7200" b="1" dirty="0">
+              <a:solidFill>
+                <a:srgbClr val="31326F"/>
+              </a:solidFill>
+            </a:endParaRPr>
+          </a:p>
+        </p:txBody>
+      </p:sp>
+      <p:pic>
+        <p:nvPicPr>
+          <p:cNvPr id="4" name="Picture 3" descr="A screenshot of a graph&#10;&#10;AI-generated content may be incorrect.">
+            <a:extLst>
+              <a:ext uri="{FF2B5EF4-FFF2-40B4-BE49-F238E27FC236}">
+                <a16:creationId xmlns:a16="http://schemas.microsoft.com/office/drawing/2014/main" id="{7646FADA-F203-CF84-7C4A-8CC31158C0E2}"/>
+              </a:ext>
+            </a:extLst>
+          </p:cNvPr>
+          <p:cNvPicPr>
+            <a:picLocks noChangeAspect="1"/>
+          </p:cNvPicPr>
+          <p:nvPr/>
+        </p:nvPicPr>
+        <p:blipFill>
+          <a:blip r:embed="rId2"/>
+          <a:stretch>
+            <a:fillRect/>
+          </a:stretch>
+        </p:blipFill>
+        <p:spPr>
+          <a:xfrm>
+            <a:off x="1455174" y="1313733"/>
+            <a:ext cx="9281651" cy="5109165"/>
+          </a:xfrm>
+          <a:prstGeom prst="rect">
+            <a:avLst/>
+          </a:prstGeom>
+        </p:spPr>
+      </p:pic>
+    </p:spTree>
+    <p:extLst>
+      <p:ext uri="{BB962C8B-B14F-4D97-AF65-F5344CB8AC3E}">
+        <p14:creationId xmlns:p14="http://schemas.microsoft.com/office/powerpoint/2010/main" val="2847118421"/>
+      </p:ext>
+    </p:extLst>
+  </p:cSld>
+  <p:clrMapOvr>
+    <a:masterClrMapping/>
+  </p:clrMapOvr>
+  <mc:AlternateContent xmlns:mc="http://schemas.openxmlformats.org/markup-compatibility/2006">
+    <mc:Choice xmlns:p159="http://schemas.microsoft.com/office/powerpoint/2015/09/main" Requires="p159">
+      <p:transition xmlns:p14="http://schemas.microsoft.com/office/powerpoint/2010/main" spd="slow" p14:dur="2000">
+        <p159:morph option="byObject"/>
+      </p:transition>
+    </mc:Choice>
+    <mc:Fallback>
+      <p:transition spd="slow">
+        <p:fade/>
+      </p:transition>
+    </mc:Fallback>
+  </mc:AlternateContent>
+</p:sld>
+</file>
+
+<file path=ppt/slides/slide22.xml><?xml version="1.0" encoding="utf-8"?>
+<p:sld xmlns:a="http://schemas.openxmlformats.org/drawingml/2006/main" xmlns:r="http://schemas.openxmlformats.org/officeDocument/2006/relationships" xmlns:p="http://schemas.openxmlformats.org/presentationml/2006/main">
+  <p:cSld>
+    <p:spTree>
+      <p:nvGrpSpPr>
+        <p:cNvPr id="1" name="">
+          <a:extLst>
+            <a:ext uri="{FF2B5EF4-FFF2-40B4-BE49-F238E27FC236}">
+              <a16:creationId xmlns:a16="http://schemas.microsoft.com/office/drawing/2014/main" id="{2EA989F6-90E0-2A65-47EC-D078A4DFC8F5}"/>
+            </a:ext>
+          </a:extLst>
+        </p:cNvPr>
+        <p:cNvGrpSpPr/>
+        <p:nvPr/>
+      </p:nvGrpSpPr>
+      <p:grpSpPr>
+        <a:xfrm>
+          <a:off x="0" y="0"/>
+          <a:ext cx="0" cy="0"/>
+          <a:chOff x="0" y="0"/>
+          <a:chExt cx="0" cy="0"/>
+        </a:xfrm>
+      </p:grpSpPr>
+      <p:sp>
+        <p:nvSpPr>
+          <p:cNvPr id="9" name="TextBox 8">
+            <a:extLst>
+              <a:ext uri="{FF2B5EF4-FFF2-40B4-BE49-F238E27FC236}">
+                <a16:creationId xmlns:a16="http://schemas.microsoft.com/office/drawing/2014/main" id="{10A28EEA-8908-9F93-B492-E7CC960F618B}"/>
+              </a:ext>
+            </a:extLst>
+          </p:cNvPr>
+          <p:cNvSpPr txBox="1"/>
+          <p:nvPr/>
+        </p:nvSpPr>
+        <p:spPr>
+          <a:xfrm>
+            <a:off x="2417583" y="113404"/>
+            <a:ext cx="7356833" cy="1200329"/>
+          </a:xfrm>
+          <a:prstGeom prst="rect">
+            <a:avLst/>
+          </a:prstGeom>
+          <a:noFill/>
+        </p:spPr>
+        <p:txBody>
+          <a:bodyPr wrap="square" rtlCol="0">
+            <a:spAutoFit/>
+          </a:bodyPr>
+          <a:lstStyle/>
+          <a:p>
+            <a:pPr algn="ctr"/>
+            <a:r>
+              <a:rPr lang="en-US" sz="7200" b="1" dirty="0">
+                <a:solidFill>
+                  <a:srgbClr val="31326F"/>
+                </a:solidFill>
+              </a:rPr>
+              <a:t>Project Overview</a:t>
+            </a:r>
+            <a:endParaRPr lang="en-IN" sz="7200" b="1" dirty="0">
+              <a:solidFill>
+                <a:srgbClr val="31326F"/>
+              </a:solidFill>
+            </a:endParaRPr>
+          </a:p>
+        </p:txBody>
+      </p:sp>
+      <p:pic>
+        <p:nvPicPr>
+          <p:cNvPr id="3" name="Picture 2" descr="A screenshot of a computer dashboard&#10;&#10;AI-generated content may be incorrect.">
+            <a:extLst>
+              <a:ext uri="{FF2B5EF4-FFF2-40B4-BE49-F238E27FC236}">
+                <a16:creationId xmlns:a16="http://schemas.microsoft.com/office/drawing/2014/main" id="{363DFFA1-80CA-5519-0EC5-8124E67E8197}"/>
+              </a:ext>
+            </a:extLst>
+          </p:cNvPr>
+          <p:cNvPicPr>
+            <a:picLocks noChangeAspect="1"/>
+          </p:cNvPicPr>
+          <p:nvPr/>
+        </p:nvPicPr>
+        <p:blipFill>
+          <a:blip r:embed="rId2"/>
+          <a:stretch>
+            <a:fillRect/>
+          </a:stretch>
+        </p:blipFill>
+        <p:spPr>
+          <a:xfrm>
+            <a:off x="1509251" y="1413522"/>
+            <a:ext cx="9173497" cy="5011318"/>
+          </a:xfrm>
+          <a:prstGeom prst="rect">
+            <a:avLst/>
+          </a:prstGeom>
+        </p:spPr>
+      </p:pic>
+    </p:spTree>
+    <p:extLst>
+      <p:ext uri="{BB962C8B-B14F-4D97-AF65-F5344CB8AC3E}">
+        <p14:creationId xmlns:p14="http://schemas.microsoft.com/office/powerpoint/2010/main" val="849172268"/>
+      </p:ext>
+    </p:extLst>
+  </p:cSld>
+  <p:clrMapOvr>
+    <a:masterClrMapping/>
+  </p:clrMapOvr>
+  <mc:AlternateContent xmlns:mc="http://schemas.openxmlformats.org/markup-compatibility/2006">
+    <mc:Choice xmlns:p159="http://schemas.microsoft.com/office/powerpoint/2015/09/main" Requires="p159">
+      <p:transition xmlns:p14="http://schemas.microsoft.com/office/powerpoint/2010/main" spd="slow" p14:dur="2000">
+        <p159:morph option="byObject"/>
+      </p:transition>
+    </mc:Choice>
+    <mc:Fallback>
+      <p:transition spd="slow">
+        <p:fade/>
+      </p:transition>
+    </mc:Fallback>
+  </mc:AlternateContent>
+</p:sld>
+</file>
+
+<file path=ppt/slides/slide23.xml><?xml version="1.0" encoding="utf-8"?>
+<p:sld xmlns:a="http://schemas.openxmlformats.org/drawingml/2006/main" xmlns:r="http://schemas.openxmlformats.org/officeDocument/2006/relationships" xmlns:p="http://schemas.openxmlformats.org/presentationml/2006/main">
+  <p:cSld>
+    <p:spTree>
+      <p:nvGrpSpPr>
+        <p:cNvPr id="1" name="">
+          <a:extLst>
+            <a:ext uri="{FF2B5EF4-FFF2-40B4-BE49-F238E27FC236}">
+              <a16:creationId xmlns:a16="http://schemas.microsoft.com/office/drawing/2014/main" id="{211D312F-F9ED-8327-04E1-2CA8DBA90D7E}"/>
+            </a:ext>
+          </a:extLst>
+        </p:cNvPr>
+        <p:cNvGrpSpPr/>
+        <p:nvPr/>
+      </p:nvGrpSpPr>
+      <p:grpSpPr>
+        <a:xfrm>
+          <a:off x="0" y="0"/>
+          <a:ext cx="0" cy="0"/>
+          <a:chOff x="0" y="0"/>
+          <a:chExt cx="0" cy="0"/>
+        </a:xfrm>
+      </p:grpSpPr>
+      <p:sp>
+        <p:nvSpPr>
+          <p:cNvPr id="9" name="TextBox 8">
+            <a:extLst>
+              <a:ext uri="{FF2B5EF4-FFF2-40B4-BE49-F238E27FC236}">
+                <a16:creationId xmlns:a16="http://schemas.microsoft.com/office/drawing/2014/main" id="{A004D799-E684-9D99-9548-B9AC18BDEDE2}"/>
+              </a:ext>
+            </a:extLst>
+          </p:cNvPr>
+          <p:cNvSpPr txBox="1"/>
+          <p:nvPr/>
+        </p:nvSpPr>
+        <p:spPr>
+          <a:xfrm>
+            <a:off x="2417583" y="113404"/>
+            <a:ext cx="7356833" cy="1200329"/>
+          </a:xfrm>
+          <a:prstGeom prst="rect">
+            <a:avLst/>
+          </a:prstGeom>
+          <a:noFill/>
+        </p:spPr>
+        <p:txBody>
+          <a:bodyPr wrap="square" rtlCol="0">
+            <a:spAutoFit/>
+          </a:bodyPr>
+          <a:lstStyle/>
+          <a:p>
+            <a:pPr algn="ctr"/>
+            <a:r>
+              <a:rPr lang="en-US" sz="7200" b="1" dirty="0">
+                <a:solidFill>
+                  <a:srgbClr val="31326F"/>
+                </a:solidFill>
+              </a:rPr>
+              <a:t>Project Overview</a:t>
+            </a:r>
+            <a:endParaRPr lang="en-IN" sz="7200" b="1" dirty="0">
+              <a:solidFill>
+                <a:srgbClr val="31326F"/>
+              </a:solidFill>
+            </a:endParaRPr>
+          </a:p>
+        </p:txBody>
+      </p:sp>
+      <p:pic>
+        <p:nvPicPr>
+          <p:cNvPr id="3" name="Picture 2" descr="A screenshot of a computer dashboard&#10;&#10;AI-generated content may be incorrect.">
+            <a:extLst>
+              <a:ext uri="{FF2B5EF4-FFF2-40B4-BE49-F238E27FC236}">
+                <a16:creationId xmlns:a16="http://schemas.microsoft.com/office/drawing/2014/main" id="{EE730AC8-9071-ACBB-7599-6237877594A1}"/>
+              </a:ext>
+            </a:extLst>
+          </p:cNvPr>
+          <p:cNvPicPr>
+            <a:picLocks noChangeAspect="1"/>
+          </p:cNvPicPr>
+          <p:nvPr/>
+        </p:nvPicPr>
+        <p:blipFill>
+          <a:blip r:embed="rId2"/>
+          <a:stretch>
+            <a:fillRect/>
+          </a:stretch>
+        </p:blipFill>
+        <p:spPr>
+          <a:xfrm>
+            <a:off x="1448696" y="1313733"/>
+            <a:ext cx="9294607" cy="5175486"/>
+          </a:xfrm>
+          <a:prstGeom prst="rect">
+            <a:avLst/>
+          </a:prstGeom>
+        </p:spPr>
+      </p:pic>
+    </p:spTree>
+    <p:extLst>
+      <p:ext uri="{BB962C8B-B14F-4D97-AF65-F5344CB8AC3E}">
+        <p14:creationId xmlns:p14="http://schemas.microsoft.com/office/powerpoint/2010/main" val="4281920370"/>
+      </p:ext>
+    </p:extLst>
+  </p:cSld>
+  <p:clrMapOvr>
+    <a:masterClrMapping/>
+  </p:clrMapOvr>
+  <mc:AlternateContent xmlns:mc="http://schemas.openxmlformats.org/markup-compatibility/2006">
+    <mc:Choice xmlns:p159="http://schemas.microsoft.com/office/powerpoint/2015/09/main" Requires="p159">
+      <p:transition xmlns:p14="http://schemas.microsoft.com/office/powerpoint/2010/main" spd="slow" p14:dur="2000">
+        <p159:morph option="byObject"/>
+      </p:transition>
+    </mc:Choice>
+    <mc:Fallback>
+      <p:transition spd="slow">
+        <p:fade/>
+      </p:transition>
+    </mc:Fallback>
+  </mc:AlternateContent>
+</p:sld>
+</file>
+
+<file path=ppt/slides/slide24.xml><?xml version="1.0" encoding="utf-8"?>
+<p:sld xmlns:a="http://schemas.openxmlformats.org/drawingml/2006/main" xmlns:r="http://schemas.openxmlformats.org/officeDocument/2006/relationships" xmlns:p="http://schemas.openxmlformats.org/presentationml/2006/main">
+  <p:cSld>
+    <p:spTree>
+      <p:nvGrpSpPr>
+        <p:cNvPr id="1" name="">
+          <a:extLst>
+            <a:ext uri="{FF2B5EF4-FFF2-40B4-BE49-F238E27FC236}">
+              <a16:creationId xmlns:a16="http://schemas.microsoft.com/office/drawing/2014/main" id="{9C384C69-9179-FA6F-6E98-8D761C67468F}"/>
+            </a:ext>
+          </a:extLst>
+        </p:cNvPr>
+        <p:cNvGrpSpPr/>
+        <p:nvPr/>
+      </p:nvGrpSpPr>
+      <p:grpSpPr>
+        <a:xfrm>
+          <a:off x="0" y="0"/>
+          <a:ext cx="0" cy="0"/>
+          <a:chOff x="0" y="0"/>
+          <a:chExt cx="0" cy="0"/>
+        </a:xfrm>
+      </p:grpSpPr>
+      <p:sp>
+        <p:nvSpPr>
+          <p:cNvPr id="9" name="TextBox 8">
+            <a:extLst>
+              <a:ext uri="{FF2B5EF4-FFF2-40B4-BE49-F238E27FC236}">
+                <a16:creationId xmlns:a16="http://schemas.microsoft.com/office/drawing/2014/main" id="{CDE76876-8992-7700-9254-1A0108A5CE60}"/>
+              </a:ext>
+            </a:extLst>
+          </p:cNvPr>
+          <p:cNvSpPr txBox="1"/>
+          <p:nvPr/>
+        </p:nvSpPr>
+        <p:spPr>
+          <a:xfrm>
+            <a:off x="2417583" y="113404"/>
+            <a:ext cx="7356833" cy="1200329"/>
+          </a:xfrm>
+          <a:prstGeom prst="rect">
+            <a:avLst/>
+          </a:prstGeom>
+          <a:noFill/>
+        </p:spPr>
+        <p:txBody>
+          <a:bodyPr wrap="square" rtlCol="0">
+            <a:spAutoFit/>
+          </a:bodyPr>
+          <a:lstStyle/>
+          <a:p>
+            <a:pPr algn="ctr"/>
+            <a:r>
+              <a:rPr lang="en-US" sz="7200" b="1" dirty="0">
+                <a:solidFill>
+                  <a:srgbClr val="31326F"/>
+                </a:solidFill>
+              </a:rPr>
+              <a:t>Project Overview</a:t>
+            </a:r>
+            <a:endParaRPr lang="en-IN" sz="7200" b="1" dirty="0">
+              <a:solidFill>
+                <a:srgbClr val="31326F"/>
+              </a:solidFill>
+            </a:endParaRPr>
+          </a:p>
+        </p:txBody>
+      </p:sp>
+      <p:pic>
+        <p:nvPicPr>
+          <p:cNvPr id="4" name="Picture 3">
+            <a:extLst>
+              <a:ext uri="{FF2B5EF4-FFF2-40B4-BE49-F238E27FC236}">
+                <a16:creationId xmlns:a16="http://schemas.microsoft.com/office/drawing/2014/main" id="{3371D96C-5915-EBFE-596B-9C71F367E68D}"/>
+              </a:ext>
+            </a:extLst>
+          </p:cNvPr>
+          <p:cNvPicPr>
+            <a:picLocks noChangeAspect="1"/>
+          </p:cNvPicPr>
+          <p:nvPr/>
+        </p:nvPicPr>
+        <p:blipFill>
+          <a:blip r:embed="rId2"/>
+          <a:stretch>
+            <a:fillRect/>
+          </a:stretch>
+        </p:blipFill>
+        <p:spPr>
+          <a:xfrm>
+            <a:off x="1398395" y="1200008"/>
+            <a:ext cx="9395209" cy="5260170"/>
+          </a:xfrm>
+          <a:prstGeom prst="rect">
+            <a:avLst/>
+          </a:prstGeom>
+        </p:spPr>
+      </p:pic>
+    </p:spTree>
+    <p:extLst>
+      <p:ext uri="{BB962C8B-B14F-4D97-AF65-F5344CB8AC3E}">
+        <p14:creationId xmlns:p14="http://schemas.microsoft.com/office/powerpoint/2010/main" val="914608958"/>
+      </p:ext>
+    </p:extLst>
+  </p:cSld>
+  <p:clrMapOvr>
+    <a:masterClrMapping/>
+  </p:clrMapOvr>
+  <mc:AlternateContent xmlns:mc="http://schemas.openxmlformats.org/markup-compatibility/2006">
+    <mc:Choice xmlns:p159="http://schemas.microsoft.com/office/powerpoint/2015/09/main" Requires="p159">
+      <p:transition xmlns:p14="http://schemas.microsoft.com/office/powerpoint/2010/main" spd="slow" p14:dur="2000">
+        <p159:morph option="byObject"/>
+      </p:transition>
+    </mc:Choice>
+    <mc:Fallback>
+      <p:transition spd="slow">
+        <p:fade/>
+      </p:transition>
+    </mc:Fallback>
+  </mc:AlternateContent>
+</p:sld>
+</file>
+
+<file path=ppt/slides/slide25.xml><?xml version="1.0" encoding="utf-8"?>
 <p:sld xmlns:a="http://schemas.openxmlformats.org/drawingml/2006/main" xmlns:r="http://schemas.openxmlformats.org/officeDocument/2006/relationships" xmlns:p="http://schemas.openxmlformats.org/presentationml/2006/main">
   <p:cSld>
     <p:spTree>

</xml_diff>